<commit_message>
Update for WEMDCD 2021 - improvement of syreDrive, presented at WEMDCD 2021 conference - general re-order of folder, with the possibility to add custom functions (in the syreCustomFunction folder) - minor bug fixed - improvement in Seg barriers parametrization - improvement in Motor-CAD export - added MMM data for mot_01 and RAWP motors - possibility to manage custom material library
</commit_message>
<xml_diff>
--- a/Readme/Documentation/2019 04 03 - Seg geometry key points.pptx
+++ b/Readme/Documentation/2019 04 03 - Seg geometry key points.pptx
@@ -7,7 +7,7 @@
     <p:sldMasterId id="2147483688" r:id="rId3"/>
   </p:sldMasterIdLst>
   <p:notesMasterIdLst>
-    <p:notesMasterId r:id="rId10"/>
+    <p:notesMasterId r:id="rId11"/>
   </p:notesMasterIdLst>
   <p:sldIdLst>
     <p:sldId id="256" r:id="rId4"/>
@@ -15,7 +15,8 @@
     <p:sldId id="258" r:id="rId6"/>
     <p:sldId id="259" r:id="rId7"/>
     <p:sldId id="260" r:id="rId8"/>
-    <p:sldId id="261" r:id="rId9"/>
+    <p:sldId id="262" r:id="rId9"/>
+    <p:sldId id="261" r:id="rId10"/>
   </p:sldIdLst>
   <p:sldSz cx="12192000" cy="6858000"/>
   <p:notesSz cx="6858000" cy="9144000"/>
@@ -204,7 +205,7 @@
           <a:p>
             <a:fld id="{45B246B8-E1AC-4DED-B86C-BE1D9F29C49E}" type="datetimeFigureOut">
               <a:rPr lang="en-US" smtClean="0"/>
-              <a:t>7/22/2019</a:t>
+              <a:t>12/9/2020</a:t>
             </a:fld>
             <a:endParaRPr lang="en-US"/>
           </a:p>
@@ -363,7 +364,7 @@
           <a:p>
             <a:fld id="{8D1BD158-E873-45BA-BB99-4DB87C9FC555}" type="slidenum">
               <a:rPr lang="en-US" smtClean="0"/>
-              <a:t>‹N›</a:t>
+              <a:t>‹#›</a:t>
             </a:fld>
             <a:endParaRPr lang="en-US"/>
           </a:p>
@@ -766,7 +767,7 @@
           <a:p>
             <a:fld id="{B0798AF0-E6B9-459F-9B86-6650733E8BB1}" type="datetime1">
               <a:rPr lang="en-US" smtClean="0"/>
-              <a:t>7/22/2019</a:t>
+              <a:t>12/9/2020</a:t>
             </a:fld>
             <a:endParaRPr lang="en-US"/>
           </a:p>
@@ -856,7 +857,7 @@
             <a:fld id="{DF5BA733-0920-462E-B6C8-B4DB09EEB2B4}" type="slidenum">
               <a:rPr lang="en-US" smtClean="0"/>
               <a:pPr/>
-              <a:t>‹N›</a:t>
+              <a:t>‹#›</a:t>
             </a:fld>
             <a:endParaRPr lang="en-US" dirty="0"/>
           </a:p>
@@ -1215,7 +1216,7 @@
           <a:p>
             <a:fld id="{572FB3C7-4794-4629-A7BD-7509A5063831}" type="datetime1">
               <a:rPr lang="en-US" smtClean="0"/>
-              <a:t>7/22/2019</a:t>
+              <a:t>12/9/2020</a:t>
             </a:fld>
             <a:endParaRPr lang="en-US"/>
           </a:p>
@@ -1305,7 +1306,7 @@
             <a:fld id="{DF5BA733-0920-462E-B6C8-B4DB09EEB2B4}" type="slidenum">
               <a:rPr lang="en-US" smtClean="0"/>
               <a:pPr/>
-              <a:t>‹N›</a:t>
+              <a:t>‹#›</a:t>
             </a:fld>
             <a:endParaRPr lang="en-US" dirty="0"/>
           </a:p>
@@ -1414,7 +1415,7 @@
           <a:p>
             <a:fld id="{FB09219E-D477-42E3-9288-365848B23CE6}" type="datetime1">
               <a:rPr lang="en-US" smtClean="0"/>
-              <a:t>7/22/2019</a:t>
+              <a:t>12/9/2020</a:t>
             </a:fld>
             <a:endParaRPr lang="en-US"/>
           </a:p>
@@ -1504,7 +1505,7 @@
             <a:fld id="{DF5BA733-0920-462E-B6C8-B4DB09EEB2B4}" type="slidenum">
               <a:rPr lang="en-US" smtClean="0"/>
               <a:pPr/>
-              <a:t>‹N›</a:t>
+              <a:t>‹#›</a:t>
             </a:fld>
             <a:endParaRPr lang="en-US"/>
           </a:p>
@@ -1579,7 +1580,7 @@
           <a:p>
             <a:fld id="{A1544B2A-C3DA-409A-A503-796F7B1629F5}" type="datetime1">
               <a:rPr lang="en-US" smtClean="0"/>
-              <a:t>7/22/2019</a:t>
+              <a:t>12/9/2020</a:t>
             </a:fld>
             <a:endParaRPr lang="en-US"/>
           </a:p>
@@ -1669,7 +1670,7 @@
             <a:fld id="{DF5BA733-0920-462E-B6C8-B4DB09EEB2B4}" type="slidenum">
               <a:rPr lang="en-US" smtClean="0"/>
               <a:pPr/>
-              <a:t>‹N›</a:t>
+              <a:t>‹#›</a:t>
             </a:fld>
             <a:endParaRPr lang="en-US"/>
           </a:p>
@@ -1898,7 +1899,7 @@
           <a:p>
             <a:fld id="{6C0B14F3-4305-4816-8434-80F0516D8B46}" type="datetime1">
               <a:rPr lang="en-US" smtClean="0"/>
-              <a:t>7/22/2019</a:t>
+              <a:t>12/9/2020</a:t>
             </a:fld>
             <a:endParaRPr lang="en-US"/>
           </a:p>
@@ -1988,7 +1989,7 @@
             <a:fld id="{DF5BA733-0920-462E-B6C8-B4DB09EEB2B4}" type="slidenum">
               <a:rPr lang="en-US" smtClean="0"/>
               <a:pPr/>
-              <a:t>‹N›</a:t>
+              <a:t>‹#›</a:t>
             </a:fld>
             <a:endParaRPr lang="en-US" dirty="0"/>
           </a:p>
@@ -2158,7 +2159,7 @@
           <a:p>
             <a:fld id="{AB4E0383-7FB9-4BD7-A10C-DD432A8F78D3}" type="datetime1">
               <a:rPr lang="en-US" smtClean="0"/>
-              <a:t>7/22/2019</a:t>
+              <a:t>12/9/2020</a:t>
             </a:fld>
             <a:endParaRPr lang="en-US"/>
           </a:p>
@@ -2248,7 +2249,7 @@
             <a:fld id="{DF5BA733-0920-462E-B6C8-B4DB09EEB2B4}" type="slidenum">
               <a:rPr lang="en-US" smtClean="0"/>
               <a:pPr/>
-              <a:t>‹N›</a:t>
+              <a:t>‹#›</a:t>
             </a:fld>
             <a:endParaRPr lang="en-US" dirty="0"/>
           </a:p>
@@ -2465,7 +2466,7 @@
           <a:p>
             <a:fld id="{9286AEC4-7C88-459A-B1A4-EAFBBBEB27A3}" type="datetime1">
               <a:rPr lang="en-US" smtClean="0"/>
-              <a:t>7/22/2019</a:t>
+              <a:t>12/9/2020</a:t>
             </a:fld>
             <a:endParaRPr lang="en-US"/>
           </a:p>
@@ -2555,7 +2556,7 @@
             <a:fld id="{DF5BA733-0920-462E-B6C8-B4DB09EEB2B4}" type="slidenum">
               <a:rPr lang="en-US" smtClean="0"/>
               <a:pPr/>
-              <a:t>‹N›</a:t>
+              <a:t>‹#›</a:t>
             </a:fld>
             <a:endParaRPr lang="en-US" dirty="0"/>
           </a:p>
@@ -2914,7 +2915,7 @@
           <a:p>
             <a:fld id="{DE39777F-4203-4F45-AFC0-CCB3D3FA3E4D}" type="datetime1">
               <a:rPr lang="en-US" smtClean="0"/>
-              <a:t>7/22/2019</a:t>
+              <a:t>12/9/2020</a:t>
             </a:fld>
             <a:endParaRPr lang="en-US"/>
           </a:p>
@@ -3004,7 +3005,7 @@
             <a:fld id="{DF5BA733-0920-462E-B6C8-B4DB09EEB2B4}" type="slidenum">
               <a:rPr lang="en-US" smtClean="0"/>
               <a:pPr/>
-              <a:t>‹N›</a:t>
+              <a:t>‹#›</a:t>
             </a:fld>
             <a:endParaRPr lang="en-US"/>
           </a:p>
@@ -3113,7 +3114,7 @@
           <a:p>
             <a:fld id="{37CEEFDE-3D5F-4157-9AFF-5DCF78B03CD9}" type="datetime1">
               <a:rPr lang="en-US" smtClean="0"/>
-              <a:t>7/22/2019</a:t>
+              <a:t>12/9/2020</a:t>
             </a:fld>
             <a:endParaRPr lang="en-US"/>
           </a:p>
@@ -3203,7 +3204,7 @@
             <a:fld id="{DF5BA733-0920-462E-B6C8-B4DB09EEB2B4}" type="slidenum">
               <a:rPr lang="en-US" smtClean="0"/>
               <a:pPr/>
-              <a:t>‹N›</a:t>
+              <a:t>‹#›</a:t>
             </a:fld>
             <a:endParaRPr lang="en-US" dirty="0"/>
           </a:p>
@@ -3278,7 +3279,7 @@
           <a:p>
             <a:fld id="{0B64BFD5-ACFF-4B05-A0DB-09984122FB93}" type="datetime1">
               <a:rPr lang="en-US" smtClean="0"/>
-              <a:t>7/22/2019</a:t>
+              <a:t>12/9/2020</a:t>
             </a:fld>
             <a:endParaRPr lang="en-US"/>
           </a:p>
@@ -3368,7 +3369,7 @@
             <a:fld id="{DF5BA733-0920-462E-B6C8-B4DB09EEB2B4}" type="slidenum">
               <a:rPr lang="en-US" smtClean="0"/>
               <a:pPr/>
-              <a:t>‹N›</a:t>
+              <a:t>‹#›</a:t>
             </a:fld>
             <a:endParaRPr lang="en-US" dirty="0"/>
           </a:p>
@@ -3534,7 +3535,7 @@
           <a:p>
             <a:fld id="{554F89B4-8D16-491F-9A8D-1EE488346714}" type="datetime1">
               <a:rPr lang="en-US" smtClean="0"/>
-              <a:t>7/22/2019</a:t>
+              <a:t>12/9/2020</a:t>
             </a:fld>
             <a:endParaRPr lang="en-US"/>
           </a:p>
@@ -3624,7 +3625,7 @@
             <a:fld id="{DF5BA733-0920-462E-B6C8-B4DB09EEB2B4}" type="slidenum">
               <a:rPr lang="en-US" smtClean="0"/>
               <a:pPr/>
-              <a:t>‹N›</a:t>
+              <a:t>‹#›</a:t>
             </a:fld>
             <a:endParaRPr lang="en-US"/>
           </a:p>
@@ -3841,7 +3842,7 @@
           <a:p>
             <a:fld id="{3FBAACC1-613D-4D7C-8AF8-6CB17B4FAF14}" type="datetime1">
               <a:rPr lang="en-US" smtClean="0"/>
-              <a:t>7/22/2019</a:t>
+              <a:t>12/9/2020</a:t>
             </a:fld>
             <a:endParaRPr lang="en-US"/>
           </a:p>
@@ -3931,7 +3932,7 @@
             <a:fld id="{DF5BA733-0920-462E-B6C8-B4DB09EEB2B4}" type="slidenum">
               <a:rPr lang="en-US" smtClean="0"/>
               <a:pPr/>
-              <a:t>‹N›</a:t>
+              <a:t>‹#›</a:t>
             </a:fld>
             <a:endParaRPr lang="en-US"/>
           </a:p>
@@ -4290,7 +4291,7 @@
           <a:p>
             <a:fld id="{018C74B7-7626-4DB5-BB2B-2000B50EB1DB}" type="datetime1">
               <a:rPr lang="en-US" smtClean="0"/>
-              <a:t>7/22/2019</a:t>
+              <a:t>12/9/2020</a:t>
             </a:fld>
             <a:endParaRPr lang="en-US"/>
           </a:p>
@@ -4380,7 +4381,7 @@
             <a:fld id="{DF5BA733-0920-462E-B6C8-B4DB09EEB2B4}" type="slidenum">
               <a:rPr lang="en-US" smtClean="0"/>
               <a:pPr/>
-              <a:t>‹N›</a:t>
+              <a:t>‹#›</a:t>
             </a:fld>
             <a:endParaRPr lang="en-US" dirty="0"/>
           </a:p>
@@ -4489,7 +4490,7 @@
           <a:p>
             <a:fld id="{C40C49E6-E397-44E3-A8CC-66C9C883E447}" type="datetime1">
               <a:rPr lang="en-US" smtClean="0"/>
-              <a:t>7/22/2019</a:t>
+              <a:t>12/9/2020</a:t>
             </a:fld>
             <a:endParaRPr lang="en-US"/>
           </a:p>
@@ -4579,7 +4580,7 @@
             <a:fld id="{DF5BA733-0920-462E-B6C8-B4DB09EEB2B4}" type="slidenum">
               <a:rPr lang="en-US" smtClean="0"/>
               <a:pPr/>
-              <a:t>‹N›</a:t>
+              <a:t>‹#›</a:t>
             </a:fld>
             <a:endParaRPr lang="en-US" dirty="0"/>
           </a:p>
@@ -4654,7 +4655,7 @@
           <a:p>
             <a:fld id="{7F661F9D-D438-4571-823B-9F91F4D6FBDC}" type="datetime1">
               <a:rPr lang="en-US" smtClean="0"/>
-              <a:t>7/22/2019</a:t>
+              <a:t>12/9/2020</a:t>
             </a:fld>
             <a:endParaRPr lang="en-US"/>
           </a:p>
@@ -4744,7 +4745,7 @@
             <a:fld id="{DF5BA733-0920-462E-B6C8-B4DB09EEB2B4}" type="slidenum">
               <a:rPr lang="en-US" smtClean="0"/>
               <a:pPr/>
-              <a:t>‹N›</a:t>
+              <a:t>‹#›</a:t>
             </a:fld>
             <a:endParaRPr lang="en-US" dirty="0"/>
           </a:p>
@@ -4973,7 +4974,7 @@
           <a:p>
             <a:fld id="{0DC24FFC-5289-4477-AB20-FAB538AFFE17}" type="datetime1">
               <a:rPr lang="en-US" smtClean="0"/>
-              <a:t>7/22/2019</a:t>
+              <a:t>12/9/2020</a:t>
             </a:fld>
             <a:endParaRPr lang="en-US"/>
           </a:p>
@@ -5063,7 +5064,7 @@
             <a:fld id="{DF5BA733-0920-462E-B6C8-B4DB09EEB2B4}" type="slidenum">
               <a:rPr lang="en-US" smtClean="0"/>
               <a:pPr/>
-              <a:t>‹N›</a:t>
+              <a:t>‹#›</a:t>
             </a:fld>
             <a:endParaRPr lang="en-US" dirty="0"/>
           </a:p>
@@ -5233,7 +5234,7 @@
           <a:p>
             <a:fld id="{FBC9CC3C-5995-450A-A085-71E0D42841E0}" type="datetime1">
               <a:rPr lang="en-US" smtClean="0"/>
-              <a:t>7/22/2019</a:t>
+              <a:t>12/9/2020</a:t>
             </a:fld>
             <a:endParaRPr lang="en-US"/>
           </a:p>
@@ -5323,7 +5324,7 @@
             <a:fld id="{DF5BA733-0920-462E-B6C8-B4DB09EEB2B4}" type="slidenum">
               <a:rPr lang="en-US" smtClean="0"/>
               <a:pPr/>
-              <a:t>‹N›</a:t>
+              <a:t>‹#›</a:t>
             </a:fld>
             <a:endParaRPr lang="en-US"/>
           </a:p>
@@ -5540,7 +5541,7 @@
           <a:p>
             <a:fld id="{0B30DFBC-B2F8-4832-BE13-606D5A30EF4C}" type="datetime1">
               <a:rPr lang="en-US" smtClean="0"/>
-              <a:t>7/22/2019</a:t>
+              <a:t>12/9/2020</a:t>
             </a:fld>
             <a:endParaRPr lang="en-US"/>
           </a:p>
@@ -5630,7 +5631,7 @@
             <a:fld id="{DF5BA733-0920-462E-B6C8-B4DB09EEB2B4}" type="slidenum">
               <a:rPr lang="en-US" smtClean="0"/>
               <a:pPr/>
-              <a:t>‹N›</a:t>
+              <a:t>‹#›</a:t>
             </a:fld>
             <a:endParaRPr lang="en-US" dirty="0"/>
           </a:p>
@@ -5902,7 +5903,7 @@
           <a:p>
             <a:fld id="{BA525BC3-CFA3-4B3C-9975-1F570B902FC4}" type="datetime1">
               <a:rPr lang="en-US" smtClean="0"/>
-              <a:t>7/22/2019</a:t>
+              <a:t>12/9/2020</a:t>
             </a:fld>
             <a:endParaRPr lang="en-US"/>
           </a:p>
@@ -5980,7 +5981,7 @@
             <a:fld id="{DF5BA733-0920-462E-B6C8-B4DB09EEB2B4}" type="slidenum">
               <a:rPr lang="en-US" smtClean="0"/>
               <a:pPr/>
-              <a:t>‹N›</a:t>
+              <a:t>‹#›</a:t>
             </a:fld>
             <a:endParaRPr lang="en-US"/>
           </a:p>
@@ -6690,7 +6691,7 @@
           <a:p>
             <a:fld id="{B46C5731-4752-4A19-9E85-6BBC6E1936D5}" type="datetime1">
               <a:rPr lang="en-US" smtClean="0"/>
-              <a:t>7/22/2019</a:t>
+              <a:t>12/9/2020</a:t>
             </a:fld>
             <a:endParaRPr lang="en-US"/>
           </a:p>
@@ -6780,7 +6781,7 @@
             <a:fld id="{DF5BA733-0920-462E-B6C8-B4DB09EEB2B4}" type="slidenum">
               <a:rPr lang="en-US" smtClean="0"/>
               <a:pPr/>
-              <a:t>‹N›</a:t>
+              <a:t>‹#›</a:t>
             </a:fld>
             <a:endParaRPr lang="en-US" dirty="0"/>
           </a:p>
@@ -7466,7 +7467,7 @@
           <a:p>
             <a:fld id="{85175CFC-0447-41DC-9A5A-66F4B77F83D5}" type="datetime1">
               <a:rPr lang="en-US" smtClean="0"/>
-              <a:t>7/22/2019</a:t>
+              <a:t>12/9/2020</a:t>
             </a:fld>
             <a:endParaRPr lang="en-US"/>
           </a:p>
@@ -7556,7 +7557,7 @@
             <a:fld id="{DF5BA733-0920-462E-B6C8-B4DB09EEB2B4}" type="slidenum">
               <a:rPr lang="en-US" smtClean="0"/>
               <a:pPr/>
-              <a:t>‹N›</a:t>
+              <a:t>‹#›</a:t>
             </a:fld>
             <a:endParaRPr lang="en-US" dirty="0"/>
           </a:p>
@@ -8019,21 +8020,13 @@
           <a:p>
             <a:r>
               <a:rPr lang="en-US" dirty="0"/>
-              <a:t>03/04/2019</a:t>
+              <a:t>28/08/2020</a:t>
             </a:r>
           </a:p>
           <a:p>
             <a:r>
               <a:rPr lang="en-US" dirty="0"/>
-              <a:t>Simone Ferrari (</a:t>
-            </a:r>
-            <a:r>
-              <a:rPr lang="en-US"/>
-              <a:t>simone.ferrari</a:t>
-            </a:r>
-            <a:r>
-              <a:rPr lang="en-US" dirty="0"/>
-              <a:t>@polito.it)</a:t>
+              <a:t>Simone Ferrari (simone.ferrari@polito.it)</a:t>
             </a:r>
           </a:p>
         </p:txBody>
@@ -8734,7 +8727,7 @@
           <a:p>
             <a:r>
               <a:rPr lang="it-IT" dirty="0" err="1"/>
-              <a:t>Permanent</a:t>
+              <a:t>Inclined</a:t>
             </a:r>
             <a:r>
               <a:rPr lang="it-IT" dirty="0"/>
@@ -8742,21 +8735,90 @@
             </a:r>
             <a:r>
               <a:rPr lang="it-IT" dirty="0" err="1"/>
-              <a:t>Magnets</a:t>
-            </a:r>
-            <a:endParaRPr lang="it-IT" dirty="0"/>
+              <a:t>ribs</a:t>
+            </a:r>
+            <a:r>
+              <a:rPr lang="it-IT" dirty="0"/>
+              <a:t> and </a:t>
+            </a:r>
+            <a:r>
+              <a:rPr lang="it-IT" dirty="0" err="1"/>
+              <a:t>Rotor</a:t>
+            </a:r>
+            <a:r>
+              <a:rPr lang="it-IT" dirty="0"/>
+              <a:t> </a:t>
+            </a:r>
+            <a:r>
+              <a:rPr lang="it-IT" dirty="0" err="1"/>
+              <a:t>Fillet</a:t>
+            </a:r>
+            <a:r>
+              <a:rPr lang="it-IT" dirty="0"/>
+              <a:t> </a:t>
+            </a:r>
+          </a:p>
+        </p:txBody>
+      </p:sp>
+      <p:sp>
+        <p:nvSpPr>
+          <p:cNvPr id="4" name="Segnaposto piè di pagina 3"/>
+          <p:cNvSpPr>
+            <a:spLocks noGrp="1"/>
+          </p:cNvSpPr>
+          <p:nvPr>
+            <p:ph type="ftr" sz="quarter" idx="3"/>
+          </p:nvPr>
+        </p:nvSpPr>
+        <p:spPr/>
+        <p:txBody>
+          <a:bodyPr/>
+          <a:lstStyle/>
+          <a:p>
+            <a:r>
+              <a:rPr lang="en-US"/>
+              <a:t>Seg key points</a:t>
+            </a:r>
+          </a:p>
+        </p:txBody>
+      </p:sp>
+      <p:sp>
+        <p:nvSpPr>
+          <p:cNvPr id="5" name="Segnaposto numero diapositiva 4"/>
+          <p:cNvSpPr>
+            <a:spLocks noGrp="1"/>
+          </p:cNvSpPr>
+          <p:nvPr>
+            <p:ph type="sldNum" sz="quarter" idx="4"/>
+          </p:nvPr>
+        </p:nvSpPr>
+        <p:spPr/>
+        <p:txBody>
+          <a:bodyPr/>
+          <a:lstStyle/>
+          <a:p>
+            <a:fld id="{DF5BA733-0920-462E-B6C8-B4DB09EEB2B4}" type="slidenum">
+              <a:rPr lang="en-US" smtClean="0"/>
+              <a:pPr/>
+              <a:t>6</a:t>
+            </a:fld>
+            <a:endParaRPr lang="en-US"/>
           </a:p>
         </p:txBody>
       </p:sp>
       <p:pic>
         <p:nvPicPr>
-          <p:cNvPr id="6" name="Segnaposto contenuto 5"/>
+          <p:cNvPr id="6" name="Picture 5" descr="Chart, line chart&#10;&#10;Description automatically generated">
+            <a:extLst>
+              <a:ext uri="{FF2B5EF4-FFF2-40B4-BE49-F238E27FC236}">
+                <a16:creationId xmlns:a16="http://schemas.microsoft.com/office/drawing/2014/main" id="{6AAA8F27-C503-49BC-961B-1E6E51CFAD30}"/>
+              </a:ext>
+            </a:extLst>
+          </p:cNvPr>
           <p:cNvPicPr>
-            <a:picLocks noGrp="1" noChangeAspect="1"/>
+            <a:picLocks noChangeAspect="1"/>
           </p:cNvPicPr>
-          <p:nvPr>
-            <p:ph idx="1"/>
-          </p:nvPr>
+          <p:nvPr/>
         </p:nvPicPr>
         <p:blipFill>
           <a:blip r:embed="rId2" cstate="print">
@@ -8772,6 +8834,133 @@
         </p:blipFill>
         <p:spPr>
           <a:xfrm>
+            <a:off x="2630587" y="1067100"/>
+            <a:ext cx="5440691" cy="4723800"/>
+          </a:xfrm>
+          <a:prstGeom prst="rect">
+            <a:avLst/>
+          </a:prstGeom>
+        </p:spPr>
+      </p:pic>
+      <p:pic>
+        <p:nvPicPr>
+          <p:cNvPr id="7" name="Segnaposto contenuto 5">
+            <a:extLst>
+              <a:ext uri="{FF2B5EF4-FFF2-40B4-BE49-F238E27FC236}">
+                <a16:creationId xmlns:a16="http://schemas.microsoft.com/office/drawing/2014/main" id="{1051F101-D657-4576-A030-931EA84C814C}"/>
+              </a:ext>
+            </a:extLst>
+          </p:cNvPr>
+          <p:cNvPicPr>
+            <a:picLocks noGrp="1" noChangeAspect="1"/>
+          </p:cNvPicPr>
+          <p:nvPr>
+            <p:ph idx="1"/>
+          </p:nvPr>
+        </p:nvPicPr>
+        <p:blipFill rotWithShape="1">
+          <a:blip r:embed="rId3" cstate="print">
+            <a:extLst>
+              <a:ext uri="{28A0092B-C50C-407E-A947-70E740481C1C}">
+                <a14:useLocalDpi xmlns:a14="http://schemas.microsoft.com/office/drawing/2010/main" val="0"/>
+              </a:ext>
+            </a:extLst>
+          </a:blip>
+          <a:srcRect l="66115" t="4499" r="7981" b="60099"/>
+          <a:stretch/>
+        </p:blipFill>
+        <p:spPr>
+          <a:xfrm>
+            <a:off x="7705817" y="1296140"/>
+            <a:ext cx="1757779" cy="1802167"/>
+          </a:xfrm>
+        </p:spPr>
+      </p:pic>
+    </p:spTree>
+    <p:extLst>
+      <p:ext uri="{BB962C8B-B14F-4D97-AF65-F5344CB8AC3E}">
+        <p14:creationId xmlns:p14="http://schemas.microsoft.com/office/powerpoint/2010/main" val="1121208780"/>
+      </p:ext>
+    </p:extLst>
+  </p:cSld>
+  <p:clrMapOvr>
+    <a:masterClrMapping/>
+  </p:clrMapOvr>
+</p:sld>
+</file>
+
+<file path=ppt/slides/slide7.xml><?xml version="1.0" encoding="utf-8"?>
+<p:sld xmlns:a="http://schemas.openxmlformats.org/drawingml/2006/main" xmlns:r="http://schemas.openxmlformats.org/officeDocument/2006/relationships" xmlns:p="http://schemas.openxmlformats.org/presentationml/2006/main">
+  <p:cSld>
+    <p:spTree>
+      <p:nvGrpSpPr>
+        <p:cNvPr id="1" name=""/>
+        <p:cNvGrpSpPr/>
+        <p:nvPr/>
+      </p:nvGrpSpPr>
+      <p:grpSpPr>
+        <a:xfrm>
+          <a:off x="0" y="0"/>
+          <a:ext cx="0" cy="0"/>
+          <a:chOff x="0" y="0"/>
+          <a:chExt cx="0" cy="0"/>
+        </a:xfrm>
+      </p:grpSpPr>
+      <p:sp>
+        <p:nvSpPr>
+          <p:cNvPr id="2" name="Titolo 1"/>
+          <p:cNvSpPr>
+            <a:spLocks noGrp="1"/>
+          </p:cNvSpPr>
+          <p:nvPr>
+            <p:ph type="title"/>
+          </p:nvPr>
+        </p:nvSpPr>
+        <p:spPr/>
+        <p:txBody>
+          <a:bodyPr/>
+          <a:lstStyle/>
+          <a:p>
+            <a:r>
+              <a:rPr lang="it-IT" dirty="0" err="1"/>
+              <a:t>Permanent</a:t>
+            </a:r>
+            <a:r>
+              <a:rPr lang="it-IT" dirty="0"/>
+              <a:t> </a:t>
+            </a:r>
+            <a:r>
+              <a:rPr lang="it-IT" dirty="0" err="1"/>
+              <a:t>Magnets</a:t>
+            </a:r>
+            <a:endParaRPr lang="it-IT" dirty="0"/>
+          </a:p>
+        </p:txBody>
+      </p:sp>
+      <p:pic>
+        <p:nvPicPr>
+          <p:cNvPr id="6" name="Segnaposto contenuto 5"/>
+          <p:cNvPicPr>
+            <a:picLocks noGrp="1" noChangeAspect="1"/>
+          </p:cNvPicPr>
+          <p:nvPr>
+            <p:ph idx="1"/>
+          </p:nvPr>
+        </p:nvPicPr>
+        <p:blipFill>
+          <a:blip r:embed="rId2" cstate="print">
+            <a:extLst>
+              <a:ext uri="{28A0092B-C50C-407E-A947-70E740481C1C}">
+                <a14:useLocalDpi xmlns:a14="http://schemas.microsoft.com/office/drawing/2010/main" val="0"/>
+              </a:ext>
+            </a:extLst>
+          </a:blip>
+          <a:stretch>
+            <a:fillRect/>
+          </a:stretch>
+        </p:blipFill>
+        <p:spPr>
+          <a:xfrm>
             <a:off x="3208103" y="1490663"/>
             <a:ext cx="5836119" cy="4378325"/>
           </a:xfrm>
@@ -8817,7 +9006,7 @@
             <a:fld id="{DF5BA733-0920-462E-B6C8-B4DB09EEB2B4}" type="slidenum">
               <a:rPr lang="en-US" smtClean="0"/>
               <a:pPr/>
-              <a:t>6</a:t>
+              <a:t>7</a:t>
             </a:fld>
             <a:endParaRPr lang="en-US"/>
           </a:p>

</xml_diff>